<commit_message>
Updated Belgian & international fits & plots
</commit_message>
<xml_diff>
--- a/plots/2021_02_09/Fig3_dataBE_Ct values_multipanel violin plot plus high viral load.pptx
+++ b/plots/2021_02_09/Fig3_dataBE_Ct values_multipanel violin plot plus high viral load.pptx
@@ -9514,7 +9514,7 @@
                 <a:alpha val="100000"/>
               </a:srgbClr>
             </a:solidFill>
-            <a:ln w="13550" cap="rnd">
+            <a:ln w="2710" cap="rnd">
               <a:solidFill>
                 <a:srgbClr val="000000">
                   <a:alpha val="100000"/>
@@ -9566,7 +9566,7 @@
                 <a:alpha val="100000"/>
               </a:srgbClr>
             </a:solidFill>
-            <a:ln w="13550" cap="rnd">
+            <a:ln w="2710" cap="rnd">
               <a:solidFill>
                 <a:srgbClr val="000000">
                   <a:alpha val="100000"/>
@@ -9606,7 +9606,7 @@
                 </a:path>
               </a:pathLst>
             </a:custGeom>
-            <a:ln w="33876" cap="flat">
+            <a:ln w="6775" cap="flat">
               <a:solidFill>
                 <a:srgbClr val="000000">
                   <a:alpha val="100000"/>
@@ -9646,7 +9646,7 @@
                 </a:path>
               </a:pathLst>
             </a:custGeom>
-            <a:ln w="33876" cap="flat">
+            <a:ln w="6775" cap="flat">
               <a:solidFill>
                 <a:srgbClr val="000000">
                   <a:alpha val="100000"/>
@@ -15992,7 +15992,7 @@
                 <a:alpha val="100000"/>
               </a:srgbClr>
             </a:solidFill>
-            <a:ln w="13550" cap="rnd">
+            <a:ln w="2710" cap="rnd">
               <a:solidFill>
                 <a:srgbClr val="000000">
                   <a:alpha val="100000"/>
@@ -16044,7 +16044,7 @@
                 <a:alpha val="100000"/>
               </a:srgbClr>
             </a:solidFill>
-            <a:ln w="13550" cap="rnd">
+            <a:ln w="2710" cap="rnd">
               <a:solidFill>
                 <a:srgbClr val="000000">
                   <a:alpha val="100000"/>
@@ -16084,7 +16084,7 @@
                 </a:path>
               </a:pathLst>
             </a:custGeom>
-            <a:ln w="33876" cap="flat">
+            <a:ln w="6775" cap="flat">
               <a:solidFill>
                 <a:srgbClr val="000000">
                   <a:alpha val="100000"/>
@@ -16124,7 +16124,7 @@
                 </a:path>
               </a:pathLst>
             </a:custGeom>
-            <a:ln w="33876" cap="flat">
+            <a:ln w="6775" cap="flat">
               <a:solidFill>
                 <a:srgbClr val="000000">
                   <a:alpha val="100000"/>

</xml_diff>